<commit_message>
added 2D mesh solution convergence study for stokes
</commit_message>
<xml_diff>
--- a/Swayam/mesh_2Dtank/ppt_2DmeshResults.pptx
+++ b/Swayam/mesh_2Dtank/ppt_2DmeshResults.pptx
@@ -5,7 +5,7 @@
     <p:sldMasterId id="2147483648" r:id="rId1"/>
   </p:sldMasterIdLst>
   <p:notesMasterIdLst>
-    <p:notesMasterId r:id="rId18"/>
+    <p:notesMasterId r:id="rId20"/>
   </p:notesMasterIdLst>
   <p:sldIdLst>
     <p:sldId id="256" r:id="rId2"/>
@@ -23,7 +23,9 @@
     <p:sldId id="269" r:id="rId14"/>
     <p:sldId id="270" r:id="rId15"/>
     <p:sldId id="271" r:id="rId16"/>
-    <p:sldId id="272" r:id="rId17"/>
+    <p:sldId id="274" r:id="rId17"/>
+    <p:sldId id="273" r:id="rId18"/>
+    <p:sldId id="272" r:id="rId19"/>
   </p:sldIdLst>
   <p:sldSz cx="12192000" cy="6858000"/>
   <p:notesSz cx="6858000" cy="9144000"/>
@@ -5747,6 +5749,436 @@
 </file>
 
 <file path=ppt/slides/slide16.xml><?xml version="1.0" encoding="utf-8"?>
+<p:sld xmlns:a="http://schemas.openxmlformats.org/drawingml/2006/main" xmlns:r="http://schemas.openxmlformats.org/officeDocument/2006/relationships" xmlns:p="http://schemas.openxmlformats.org/presentationml/2006/main">
+  <p:cSld>
+    <p:bg>
+      <p:bgPr>
+        <a:solidFill>
+          <a:schemeClr val="bg1"/>
+        </a:solidFill>
+        <a:effectLst/>
+      </p:bgPr>
+    </p:bg>
+    <p:spTree>
+      <p:nvGrpSpPr>
+        <p:cNvPr id="1" name=""/>
+        <p:cNvGrpSpPr/>
+        <p:nvPr/>
+      </p:nvGrpSpPr>
+      <p:grpSpPr>
+        <a:xfrm>
+          <a:off x="0" y="0"/>
+          <a:ext cx="0" cy="0"/>
+          <a:chOff x="0" y="0"/>
+          <a:chExt cx="0" cy="0"/>
+        </a:xfrm>
+      </p:grpSpPr>
+      <p:sp useBgFill="1">
+        <p:nvSpPr>
+          <p:cNvPr id="8" name="Rectangle 7">
+            <a:extLst>
+              <a:ext uri="{FF2B5EF4-FFF2-40B4-BE49-F238E27FC236}">
+                <a16:creationId xmlns:a16="http://schemas.microsoft.com/office/drawing/2014/main" id="{E722B2DD-E14D-4972-9D98-5D6E61B1B2D2}"/>
+              </a:ext>
+              <a:ext uri="{C183D7F6-B498-43B3-948B-1728B52AA6E4}">
+                <adec:decorative xmlns:adec="http://schemas.microsoft.com/office/drawing/2017/decorative" val="1"/>
+              </a:ext>
+            </a:extLst>
+          </p:cNvPr>
+          <p:cNvSpPr>
+            <a:spLocks noGrp="1" noRot="1" noChangeAspect="1" noMove="1" noResize="1" noEditPoints="1" noAdjustHandles="1" noChangeArrowheads="1" noChangeShapeType="1" noTextEdit="1"/>
+          </p:cNvSpPr>
+          <p:nvPr>
+            <p:extLst>
+              <p:ext uri="{386F3935-93C4-4BCD-93E2-E3B085C9AB24}">
+                <p16:designElem xmlns:p16="http://schemas.microsoft.com/office/powerpoint/2015/main" val="1"/>
+              </p:ext>
+            </p:extLst>
+          </p:nvPr>
+        </p:nvSpPr>
+        <p:spPr>
+          <a:xfrm>
+            <a:off x="0" y="0"/>
+            <a:ext cx="12192000" cy="6858000"/>
+          </a:xfrm>
+          <a:prstGeom prst="rect">
+            <a:avLst/>
+          </a:prstGeom>
+          <a:ln>
+            <a:noFill/>
+          </a:ln>
+          <a:effectLst/>
+        </p:spPr>
+        <p:style>
+          <a:lnRef idx="2">
+            <a:schemeClr val="accent1">
+              <a:shade val="50000"/>
+            </a:schemeClr>
+          </a:lnRef>
+          <a:fillRef idx="1">
+            <a:schemeClr val="accent1"/>
+          </a:fillRef>
+          <a:effectRef idx="0">
+            <a:schemeClr val="accent1"/>
+          </a:effectRef>
+          <a:fontRef idx="minor">
+            <a:schemeClr val="lt1"/>
+          </a:fontRef>
+        </p:style>
+        <p:txBody>
+          <a:bodyPr rtlCol="0" anchor="ctr"/>
+          <a:lstStyle/>
+          <a:p>
+            <a:pPr algn="ctr"/>
+            <a:endParaRPr lang="en-US"/>
+          </a:p>
+        </p:txBody>
+      </p:sp>
+      <p:sp useBgFill="1">
+        <p:nvSpPr>
+          <p:cNvPr id="10" name="Rectangle 9">
+            <a:extLst>
+              <a:ext uri="{FF2B5EF4-FFF2-40B4-BE49-F238E27FC236}">
+                <a16:creationId xmlns:a16="http://schemas.microsoft.com/office/drawing/2014/main" id="{0CFB124C-4B0C-4A81-8633-17257B151642}"/>
+              </a:ext>
+              <a:ext uri="{C183D7F6-B498-43B3-948B-1728B52AA6E4}">
+                <adec:decorative xmlns:adec="http://schemas.microsoft.com/office/drawing/2017/decorative" val="1"/>
+              </a:ext>
+            </a:extLst>
+          </p:cNvPr>
+          <p:cNvSpPr>
+            <a:spLocks noGrp="1" noRot="1" noChangeAspect="1" noMove="1" noResize="1" noEditPoints="1" noAdjustHandles="1" noChangeArrowheads="1" noChangeShapeType="1" noTextEdit="1"/>
+          </p:cNvSpPr>
+          <p:nvPr>
+            <p:extLst>
+              <p:ext uri="{386F3935-93C4-4BCD-93E2-E3B085C9AB24}">
+                <p16:designElem xmlns:p16="http://schemas.microsoft.com/office/powerpoint/2015/main" val="1"/>
+              </p:ext>
+            </p:extLst>
+          </p:nvPr>
+        </p:nvSpPr>
+        <p:spPr>
+          <a:xfrm>
+            <a:off x="1882006" y="569844"/>
+            <a:ext cx="8427988" cy="5649981"/>
+          </a:xfrm>
+          <a:prstGeom prst="rect">
+            <a:avLst/>
+          </a:prstGeom>
+          <a:ln>
+            <a:noFill/>
+          </a:ln>
+          <a:effectLst>
+            <a:outerShdw blurRad="317500" dist="317500" dir="7140000" sx="95000" sy="95000" algn="t" rotWithShape="0">
+              <a:srgbClr val="000000">
+                <a:alpha val="25000"/>
+              </a:srgbClr>
+            </a:outerShdw>
+          </a:effectLst>
+        </p:spPr>
+        <p:style>
+          <a:lnRef idx="2">
+            <a:schemeClr val="accent1">
+              <a:shade val="50000"/>
+            </a:schemeClr>
+          </a:lnRef>
+          <a:fillRef idx="1">
+            <a:schemeClr val="accent1"/>
+          </a:fillRef>
+          <a:effectRef idx="0">
+            <a:schemeClr val="accent1"/>
+          </a:effectRef>
+          <a:fontRef idx="minor">
+            <a:schemeClr val="lt1"/>
+          </a:fontRef>
+        </p:style>
+        <p:txBody>
+          <a:bodyPr rtlCol="0" anchor="ctr"/>
+          <a:lstStyle/>
+          <a:p>
+            <a:pPr algn="ctr"/>
+            <a:endParaRPr lang="en-US" dirty="0"/>
+          </a:p>
+        </p:txBody>
+      </p:sp>
+      <p:pic>
+        <p:nvPicPr>
+          <p:cNvPr id="3" name="Picture 2" descr="A graph of a number of dofs&#10;&#10;AI-generated content may be incorrect.">
+            <a:extLst>
+              <a:ext uri="{FF2B5EF4-FFF2-40B4-BE49-F238E27FC236}">
+                <a16:creationId xmlns:a16="http://schemas.microsoft.com/office/drawing/2014/main" id="{CC539D5A-7812-FA81-FD49-0C122A7D9B1E}"/>
+              </a:ext>
+            </a:extLst>
+          </p:cNvPr>
+          <p:cNvPicPr>
+            <a:picLocks noChangeAspect="1"/>
+          </p:cNvPicPr>
+          <p:nvPr/>
+        </p:nvPicPr>
+        <p:blipFill>
+          <a:blip r:embed="rId2">
+            <a:extLst>
+              <a:ext uri="{28A0092B-C50C-407E-A947-70E740481C1C}">
+                <a14:useLocalDpi xmlns:a14="http://schemas.microsoft.com/office/drawing/2010/main" val="0"/>
+              </a:ext>
+            </a:extLst>
+          </a:blip>
+          <a:srcRect r="162"/>
+          <a:stretch>
+            <a:fillRect/>
+          </a:stretch>
+        </p:blipFill>
+        <p:spPr>
+          <a:xfrm>
+            <a:off x="1882006" y="569843"/>
+            <a:ext cx="8450714" cy="5649981"/>
+          </a:xfrm>
+          <a:prstGeom prst="rect">
+            <a:avLst/>
+          </a:prstGeom>
+        </p:spPr>
+      </p:pic>
+    </p:spTree>
+    <p:extLst>
+      <p:ext uri="{BB962C8B-B14F-4D97-AF65-F5344CB8AC3E}">
+        <p14:creationId xmlns:p14="http://schemas.microsoft.com/office/powerpoint/2010/main" val="1160654523"/>
+      </p:ext>
+    </p:extLst>
+  </p:cSld>
+  <p:clrMapOvr>
+    <a:masterClrMapping/>
+  </p:clrMapOvr>
+  <mc:AlternateContent xmlns:mc="http://schemas.openxmlformats.org/markup-compatibility/2006">
+    <mc:Choice xmlns:p14="http://schemas.microsoft.com/office/powerpoint/2010/main" Requires="p14">
+      <p:transition spd="med" p14:dur="700">
+        <p:fade/>
+      </p:transition>
+    </mc:Choice>
+    <mc:Fallback>
+      <p:transition spd="med">
+        <p:fade/>
+      </p:transition>
+    </mc:Fallback>
+  </mc:AlternateContent>
+</p:sld>
+</file>
+
+<file path=ppt/slides/slide17.xml><?xml version="1.0" encoding="utf-8"?>
+<p:sld xmlns:a="http://schemas.openxmlformats.org/drawingml/2006/main" xmlns:r="http://schemas.openxmlformats.org/officeDocument/2006/relationships" xmlns:p="http://schemas.openxmlformats.org/presentationml/2006/main">
+  <p:cSld>
+    <p:bg>
+      <p:bgPr>
+        <a:solidFill>
+          <a:schemeClr val="bg1"/>
+        </a:solidFill>
+        <a:effectLst/>
+      </p:bgPr>
+    </p:bg>
+    <p:spTree>
+      <p:nvGrpSpPr>
+        <p:cNvPr id="1" name=""/>
+        <p:cNvGrpSpPr/>
+        <p:nvPr/>
+      </p:nvGrpSpPr>
+      <p:grpSpPr>
+        <a:xfrm>
+          <a:off x="0" y="0"/>
+          <a:ext cx="0" cy="0"/>
+          <a:chOff x="0" y="0"/>
+          <a:chExt cx="0" cy="0"/>
+        </a:xfrm>
+      </p:grpSpPr>
+      <p:sp useBgFill="1">
+        <p:nvSpPr>
+          <p:cNvPr id="15" name="Rectangle 14">
+            <a:extLst>
+              <a:ext uri="{FF2B5EF4-FFF2-40B4-BE49-F238E27FC236}">
+                <a16:creationId xmlns:a16="http://schemas.microsoft.com/office/drawing/2014/main" id="{E722B2DD-E14D-4972-9D98-5D6E61B1B2D2}"/>
+              </a:ext>
+              <a:ext uri="{C183D7F6-B498-43B3-948B-1728B52AA6E4}">
+                <adec:decorative xmlns:adec="http://schemas.microsoft.com/office/drawing/2017/decorative" val="1"/>
+              </a:ext>
+            </a:extLst>
+          </p:cNvPr>
+          <p:cNvSpPr>
+            <a:spLocks noGrp="1" noRot="1" noChangeAspect="1" noMove="1" noResize="1" noEditPoints="1" noAdjustHandles="1" noChangeArrowheads="1" noChangeShapeType="1" noTextEdit="1"/>
+          </p:cNvSpPr>
+          <p:nvPr>
+            <p:extLst>
+              <p:ext uri="{386F3935-93C4-4BCD-93E2-E3B085C9AB24}">
+                <p16:designElem xmlns:p16="http://schemas.microsoft.com/office/powerpoint/2015/main" val="1"/>
+              </p:ext>
+            </p:extLst>
+          </p:nvPr>
+        </p:nvSpPr>
+        <p:spPr>
+          <a:xfrm>
+            <a:off x="0" y="0"/>
+            <a:ext cx="12192000" cy="6858000"/>
+          </a:xfrm>
+          <a:prstGeom prst="rect">
+            <a:avLst/>
+          </a:prstGeom>
+          <a:ln>
+            <a:noFill/>
+          </a:ln>
+          <a:effectLst/>
+        </p:spPr>
+        <p:style>
+          <a:lnRef idx="2">
+            <a:schemeClr val="accent1">
+              <a:shade val="50000"/>
+            </a:schemeClr>
+          </a:lnRef>
+          <a:fillRef idx="1">
+            <a:schemeClr val="accent1"/>
+          </a:fillRef>
+          <a:effectRef idx="0">
+            <a:schemeClr val="accent1"/>
+          </a:effectRef>
+          <a:fontRef idx="minor">
+            <a:schemeClr val="lt1"/>
+          </a:fontRef>
+        </p:style>
+        <p:txBody>
+          <a:bodyPr rtlCol="0" anchor="ctr"/>
+          <a:lstStyle/>
+          <a:p>
+            <a:pPr algn="ctr"/>
+            <a:endParaRPr lang="en-US"/>
+          </a:p>
+        </p:txBody>
+      </p:sp>
+      <p:sp useBgFill="1">
+        <p:nvSpPr>
+          <p:cNvPr id="17" name="Rectangle 16">
+            <a:extLst>
+              <a:ext uri="{FF2B5EF4-FFF2-40B4-BE49-F238E27FC236}">
+                <a16:creationId xmlns:a16="http://schemas.microsoft.com/office/drawing/2014/main" id="{0CFB124C-4B0C-4A81-8633-17257B151642}"/>
+              </a:ext>
+              <a:ext uri="{C183D7F6-B498-43B3-948B-1728B52AA6E4}">
+                <adec:decorative xmlns:adec="http://schemas.microsoft.com/office/drawing/2017/decorative" val="1"/>
+              </a:ext>
+            </a:extLst>
+          </p:cNvPr>
+          <p:cNvSpPr>
+            <a:spLocks noGrp="1" noRot="1" noChangeAspect="1" noMove="1" noResize="1" noEditPoints="1" noAdjustHandles="1" noChangeArrowheads="1" noChangeShapeType="1" noTextEdit="1"/>
+          </p:cNvSpPr>
+          <p:nvPr>
+            <p:extLst>
+              <p:ext uri="{386F3935-93C4-4BCD-93E2-E3B085C9AB24}">
+                <p16:designElem xmlns:p16="http://schemas.microsoft.com/office/powerpoint/2015/main" val="1"/>
+              </p:ext>
+            </p:extLst>
+          </p:nvPr>
+        </p:nvSpPr>
+        <p:spPr>
+          <a:xfrm>
+            <a:off x="1882006" y="569844"/>
+            <a:ext cx="8427988" cy="5649981"/>
+          </a:xfrm>
+          <a:prstGeom prst="rect">
+            <a:avLst/>
+          </a:prstGeom>
+          <a:ln>
+            <a:noFill/>
+          </a:ln>
+          <a:effectLst>
+            <a:outerShdw blurRad="317500" dist="317500" dir="7140000" sx="95000" sy="95000" algn="t" rotWithShape="0">
+              <a:srgbClr val="000000">
+                <a:alpha val="25000"/>
+              </a:srgbClr>
+            </a:outerShdw>
+          </a:effectLst>
+        </p:spPr>
+        <p:style>
+          <a:lnRef idx="2">
+            <a:schemeClr val="accent1">
+              <a:shade val="50000"/>
+            </a:schemeClr>
+          </a:lnRef>
+          <a:fillRef idx="1">
+            <a:schemeClr val="accent1"/>
+          </a:fillRef>
+          <a:effectRef idx="0">
+            <a:schemeClr val="accent1"/>
+          </a:effectRef>
+          <a:fontRef idx="minor">
+            <a:schemeClr val="lt1"/>
+          </a:fontRef>
+        </p:style>
+        <p:txBody>
+          <a:bodyPr rtlCol="0" anchor="ctr"/>
+          <a:lstStyle/>
+          <a:p>
+            <a:pPr algn="ctr"/>
+            <a:endParaRPr lang="en-US" dirty="0"/>
+          </a:p>
+        </p:txBody>
+      </p:sp>
+      <p:pic>
+        <p:nvPicPr>
+          <p:cNvPr id="3" name="Picture 2" descr="A graph of a graph of a graph of a graph of a graph of a graph of a graph of a graph of a graph of a graph of a graph of a graph of a graph of&#10;&#10;AI-generated content may be incorrect.">
+            <a:extLst>
+              <a:ext uri="{FF2B5EF4-FFF2-40B4-BE49-F238E27FC236}">
+                <a16:creationId xmlns:a16="http://schemas.microsoft.com/office/drawing/2014/main" id="{A0CD0BA7-6029-2BE2-AB1B-AA7B41026EB7}"/>
+              </a:ext>
+            </a:extLst>
+          </p:cNvPr>
+          <p:cNvPicPr>
+            <a:picLocks noChangeAspect="1"/>
+          </p:cNvPicPr>
+          <p:nvPr/>
+        </p:nvPicPr>
+        <p:blipFill>
+          <a:blip r:embed="rId2">
+            <a:extLst>
+              <a:ext uri="{28A0092B-C50C-407E-A947-70E740481C1C}">
+                <a14:useLocalDpi xmlns:a14="http://schemas.microsoft.com/office/drawing/2010/main" val="0"/>
+              </a:ext>
+            </a:extLst>
+          </a:blip>
+          <a:srcRect r="162"/>
+          <a:stretch>
+            <a:fillRect/>
+          </a:stretch>
+        </p:blipFill>
+        <p:spPr>
+          <a:xfrm>
+            <a:off x="1882006" y="569843"/>
+            <a:ext cx="8450714" cy="5649981"/>
+          </a:xfrm>
+          <a:prstGeom prst="rect">
+            <a:avLst/>
+          </a:prstGeom>
+        </p:spPr>
+      </p:pic>
+    </p:spTree>
+    <p:extLst>
+      <p:ext uri="{BB962C8B-B14F-4D97-AF65-F5344CB8AC3E}">
+        <p14:creationId xmlns:p14="http://schemas.microsoft.com/office/powerpoint/2010/main" val="4100496992"/>
+      </p:ext>
+    </p:extLst>
+  </p:cSld>
+  <p:clrMapOvr>
+    <a:masterClrMapping/>
+  </p:clrMapOvr>
+  <mc:AlternateContent xmlns:mc="http://schemas.openxmlformats.org/markup-compatibility/2006">
+    <mc:Choice xmlns:p14="http://schemas.microsoft.com/office/powerpoint/2010/main" Requires="p14">
+      <p:transition spd="med" p14:dur="700">
+        <p:fade/>
+      </p:transition>
+    </mc:Choice>
+    <mc:Fallback>
+      <p:transition spd="med">
+        <p:fade/>
+      </p:transition>
+    </mc:Fallback>
+  </mc:AlternateContent>
+</p:sld>
+</file>
+
+<file path=ppt/slides/slide18.xml><?xml version="1.0" encoding="utf-8"?>
 <p:sld xmlns:a="http://schemas.openxmlformats.org/drawingml/2006/main" xmlns:r="http://schemas.openxmlformats.org/officeDocument/2006/relationships" xmlns:p="http://schemas.openxmlformats.org/presentationml/2006/main">
   <p:cSld>
     <p:spTree>

</xml_diff>